<commit_message>
tender file for tech modfied.
</commit_message>
<xml_diff>
--- a/uploads/投标文件制作工具-技术部分.pptx
+++ b/uploads/投标文件制作工具-技术部分.pptx
@@ -5,7 +5,7 @@
     <p:sldMasterId id="2147483648" r:id="rId1"/>
   </p:sldMasterIdLst>
   <p:notesMasterIdLst>
-    <p:notesMasterId r:id="rId15"/>
+    <p:notesMasterId r:id="rId16"/>
   </p:notesMasterIdLst>
   <p:sldIdLst>
     <p:sldId id="256" r:id="rId2"/>
@@ -18,9 +18,10 @@
     <p:sldId id="266" r:id="rId9"/>
     <p:sldId id="267" r:id="rId10"/>
     <p:sldId id="268" r:id="rId11"/>
-    <p:sldId id="269" r:id="rId12"/>
-    <p:sldId id="270" r:id="rId13"/>
-    <p:sldId id="271" r:id="rId14"/>
+    <p:sldId id="273" r:id="rId12"/>
+    <p:sldId id="269" r:id="rId13"/>
+    <p:sldId id="270" r:id="rId14"/>
+    <p:sldId id="271" r:id="rId15"/>
   </p:sldIdLst>
   <p:sldSz cx="13004800" cy="9753600"/>
   <p:notesSz cx="6858000" cy="9144000"/>
@@ -2797,7 +2798,7 @@
           </a:ln>
           <a:extLst>
             <a:ext uri="{C572A759-6A51-4108-AA02-DFA0A04FC94B}">
-              <ma14:wrappingTextBoxFlag xmlns="" xmlns:ma14="http://schemas.microsoft.com/office/mac/drawingml/2011/main" val="1"/>
+              <ma14:wrappingTextBoxFlag xmlns:ma14="http://schemas.microsoft.com/office/mac/drawingml/2011/main" xmlns="" val="1"/>
             </a:ext>
           </a:extLst>
         </p:spPr>
@@ -2836,7 +2837,7 @@
           </a:ln>
           <a:extLst>
             <a:ext uri="{C572A759-6A51-4108-AA02-DFA0A04FC94B}">
-              <ma14:wrappingTextBoxFlag xmlns="" xmlns:ma14="http://schemas.microsoft.com/office/mac/drawingml/2011/main" val="1"/>
+              <ma14:wrappingTextBoxFlag xmlns:ma14="http://schemas.microsoft.com/office/mac/drawingml/2011/main" xmlns="" val="1"/>
             </a:ext>
           </a:extLst>
         </p:spPr>
@@ -3924,7 +3925,7 @@
           </a:ln>
           <a:extLst>
             <a:ext uri="{C572A759-6A51-4108-AA02-DFA0A04FC94B}">
-              <ma14:wrappingTextBoxFlag xmlns="" xmlns:ma14="http://schemas.microsoft.com/office/mac/drawingml/2011/main" val="1"/>
+              <ma14:wrappingTextBoxFlag xmlns:ma14="http://schemas.microsoft.com/office/mac/drawingml/2011/main" xmlns="" val="1"/>
             </a:ext>
           </a:extLst>
         </p:spPr>
@@ -4000,7 +4001,7 @@
           </a:ln>
           <a:extLst>
             <a:ext uri="{C572A759-6A51-4108-AA02-DFA0A04FC94B}">
-              <ma14:wrappingTextBoxFlag xmlns="" xmlns:ma14="http://schemas.microsoft.com/office/mac/drawingml/2011/main" val="1"/>
+              <ma14:wrappingTextBoxFlag xmlns:ma14="http://schemas.microsoft.com/office/mac/drawingml/2011/main" xmlns="" val="1"/>
             </a:ext>
           </a:extLst>
         </p:spPr>
@@ -4053,7 +4054,7 @@
           </a:ln>
           <a:extLst>
             <a:ext uri="{C572A759-6A51-4108-AA02-DFA0A04FC94B}">
-              <ma14:wrappingTextBoxFlag xmlns="" xmlns:ma14="http://schemas.microsoft.com/office/mac/drawingml/2011/main" val="1"/>
+              <ma14:wrappingTextBoxFlag xmlns:ma14="http://schemas.microsoft.com/office/mac/drawingml/2011/main" xmlns="" val="1"/>
             </a:ext>
           </a:extLst>
         </p:spPr>
@@ -4097,7 +4098,7 @@
           </a:ln>
           <a:extLst>
             <a:ext uri="{C572A759-6A51-4108-AA02-DFA0A04FC94B}">
-              <ma14:wrappingTextBoxFlag xmlns="" xmlns:ma14="http://schemas.microsoft.com/office/mac/drawingml/2011/main" val="1"/>
+              <ma14:wrappingTextBoxFlag xmlns:ma14="http://schemas.microsoft.com/office/mac/drawingml/2011/main" xmlns="" val="1"/>
             </a:ext>
           </a:extLst>
         </p:spPr>
@@ -4141,7 +4142,7 @@
           </a:ln>
           <a:extLst>
             <a:ext uri="{C572A759-6A51-4108-AA02-DFA0A04FC94B}">
-              <ma14:wrappingTextBoxFlag xmlns="" xmlns:ma14="http://schemas.microsoft.com/office/mac/drawingml/2011/main" val="1"/>
+              <ma14:wrappingTextBoxFlag xmlns:ma14="http://schemas.microsoft.com/office/mac/drawingml/2011/main" xmlns="" val="1"/>
             </a:ext>
           </a:extLst>
         </p:spPr>
@@ -4185,7 +4186,7 @@
           </a:ln>
           <a:extLst>
             <a:ext uri="{C572A759-6A51-4108-AA02-DFA0A04FC94B}">
-              <ma14:wrappingTextBoxFlag xmlns="" xmlns:ma14="http://schemas.microsoft.com/office/mac/drawingml/2011/main" val="1"/>
+              <ma14:wrappingTextBoxFlag xmlns:ma14="http://schemas.microsoft.com/office/mac/drawingml/2011/main" xmlns="" val="1"/>
             </a:ext>
           </a:extLst>
         </p:spPr>
@@ -4235,7 +4236,7 @@
           </a:ln>
           <a:extLst>
             <a:ext uri="{C572A759-6A51-4108-AA02-DFA0A04FC94B}">
-              <ma14:wrappingTextBoxFlag xmlns="" xmlns:ma14="http://schemas.microsoft.com/office/mac/drawingml/2011/main" val="1"/>
+              <ma14:wrappingTextBoxFlag xmlns:ma14="http://schemas.microsoft.com/office/mac/drawingml/2011/main" xmlns="" val="1"/>
             </a:ext>
           </a:extLst>
         </p:spPr>
@@ -4375,7 +4376,7 @@
           </a:ln>
           <a:extLst>
             <a:ext uri="{C572A759-6A51-4108-AA02-DFA0A04FC94B}">
-              <ma14:wrappingTextBoxFlag xmlns="" xmlns:ma14="http://schemas.microsoft.com/office/mac/drawingml/2011/main" val="1"/>
+              <ma14:wrappingTextBoxFlag xmlns:ma14="http://schemas.microsoft.com/office/mac/drawingml/2011/main" xmlns="" val="1"/>
             </a:ext>
           </a:extLst>
         </p:spPr>
@@ -4412,7 +4413,7 @@
           </a:ln>
           <a:extLst>
             <a:ext uri="{C572A759-6A51-4108-AA02-DFA0A04FC94B}">
-              <ma14:wrappingTextBoxFlag xmlns="" xmlns:ma14="http://schemas.microsoft.com/office/mac/drawingml/2011/main" val="1"/>
+              <ma14:wrappingTextBoxFlag xmlns:ma14="http://schemas.microsoft.com/office/mac/drawingml/2011/main" xmlns="" val="1"/>
             </a:ext>
           </a:extLst>
         </p:spPr>
@@ -4464,7 +4465,7 @@
           </a:ln>
           <a:extLst>
             <a:ext uri="{C572A759-6A51-4108-AA02-DFA0A04FC94B}">
-              <ma14:wrappingTextBoxFlag xmlns="" xmlns:ma14="http://schemas.microsoft.com/office/mac/drawingml/2011/main" val="1"/>
+              <ma14:wrappingTextBoxFlag xmlns:ma14="http://schemas.microsoft.com/office/mac/drawingml/2011/main" xmlns="" val="1"/>
             </a:ext>
           </a:extLst>
         </p:spPr>
@@ -4502,7 +4503,7 @@
           </a:ln>
           <a:extLst>
             <a:ext uri="{C572A759-6A51-4108-AA02-DFA0A04FC94B}">
-              <ma14:wrappingTextBoxFlag xmlns="" xmlns:ma14="http://schemas.microsoft.com/office/mac/drawingml/2011/main" val="1"/>
+              <ma14:wrappingTextBoxFlag xmlns:ma14="http://schemas.microsoft.com/office/mac/drawingml/2011/main" xmlns="" val="1"/>
             </a:ext>
           </a:extLst>
         </p:spPr>
@@ -4627,7 +4628,7 @@
           </a:ln>
           <a:extLst>
             <a:ext uri="{C572A759-6A51-4108-AA02-DFA0A04FC94B}">
-              <ma14:wrappingTextBoxFlag xmlns="" xmlns:ma14="http://schemas.microsoft.com/office/mac/drawingml/2011/main" val="1"/>
+              <ma14:wrappingTextBoxFlag xmlns:ma14="http://schemas.microsoft.com/office/mac/drawingml/2011/main" xmlns="" val="1"/>
             </a:ext>
           </a:extLst>
         </p:spPr>
@@ -4662,7 +4663,7 @@
           </a:ln>
           <a:extLst>
             <a:ext uri="{C572A759-6A51-4108-AA02-DFA0A04FC94B}">
-              <ma14:wrappingTextBoxFlag xmlns="" xmlns:ma14="http://schemas.microsoft.com/office/mac/drawingml/2011/main" val="1"/>
+              <ma14:wrappingTextBoxFlag xmlns:ma14="http://schemas.microsoft.com/office/mac/drawingml/2011/main" xmlns="" val="1"/>
             </a:ext>
           </a:extLst>
         </p:spPr>
@@ -4697,7 +4698,7 @@
           </a:ln>
           <a:extLst>
             <a:ext uri="{C572A759-6A51-4108-AA02-DFA0A04FC94B}">
-              <ma14:wrappingTextBoxFlag xmlns="" xmlns:ma14="http://schemas.microsoft.com/office/mac/drawingml/2011/main" val="1"/>
+              <ma14:wrappingTextBoxFlag xmlns:ma14="http://schemas.microsoft.com/office/mac/drawingml/2011/main" xmlns="" val="1"/>
             </a:ext>
           </a:extLst>
         </p:spPr>
@@ -4768,7 +4769,7 @@
           </a:ln>
           <a:extLst>
             <a:ext uri="{C572A759-6A51-4108-AA02-DFA0A04FC94B}">
-              <ma14:wrappingTextBoxFlag xmlns="" xmlns:ma14="http://schemas.microsoft.com/office/mac/drawingml/2011/main" val="1"/>
+              <ma14:wrappingTextBoxFlag xmlns:ma14="http://schemas.microsoft.com/office/mac/drawingml/2011/main" xmlns="" val="1"/>
             </a:ext>
           </a:extLst>
         </p:spPr>
@@ -4819,37 +4820,167 @@
       </p:grpSpPr>
       <p:sp>
         <p:nvSpPr>
-          <p:cNvPr id="192" name="总体设计-数据库设计"/>
-          <p:cNvSpPr txBox="1">
+          <p:cNvPr id="2" name="标题 1"/>
+          <p:cNvSpPr>
             <a:spLocks noGrp="1"/>
           </p:cNvSpPr>
           <p:nvPr>
             <p:ph type="title"/>
           </p:nvPr>
         </p:nvSpPr>
-        <p:spPr>
+        <p:spPr/>
+        <p:txBody>
+          <a:bodyPr/>
+          <a:lstStyle/>
+          <a:p>
+            <a:endParaRPr lang="zh-CN" altLang="en-US"/>
+          </a:p>
+        </p:txBody>
+      </p:sp>
+      <p:sp>
+        <p:nvSpPr>
+          <p:cNvPr id="4" name="文件系统"/>
+          <p:cNvSpPr/>
+          <p:nvPr/>
+        </p:nvSpPr>
+        <p:spPr>
+          <a:xfrm>
+            <a:off x="508000" y="3023119"/>
+            <a:ext cx="2471589" cy="689382"/>
+          </a:xfrm>
           <a:prstGeom prst="rect">
             <a:avLst/>
           </a:prstGeom>
-        </p:spPr>
-        <p:txBody>
-          <a:bodyPr/>
+          <a:blipFill>
+            <a:blip r:embed="rId2"/>
+          </a:blipFill>
+          <a:ln w="12700">
+            <a:miter lim="400000"/>
+          </a:ln>
+          <a:extLst>
+            <a:ext uri="{C572A759-6A51-4108-AA02-DFA0A04FC94B}">
+              <ma14:wrappingTextBoxFlag xmlns:ma14="http://schemas.microsoft.com/office/mac/drawingml/2011/main" xmlns="" val="1"/>
+            </a:ext>
+          </a:extLst>
+        </p:spPr>
+        <p:txBody>
+          <a:bodyPr lIns="50800" tIns="50800" rIns="50800" bIns="50800" anchor="ctr"/>
           <a:lstStyle>
-            <a:lvl1pPr defTabSz="525779">
-              <a:spcBef>
-                <a:spcPts val="1400"/>
-              </a:spcBef>
-              <a:defRPr sz="6300"/>
+            <a:lvl1pPr>
+              <a:defRPr sz="3200">
+                <a:solidFill>
+                  <a:srgbClr val="FFFFFF"/>
+                </a:solidFill>
+              </a:defRPr>
             </a:lvl1pPr>
           </a:lstStyle>
           <a:p>
             <a:r>
-              <a:t>总体设计-数据库设计</a:t>
-            </a:r>
+              <a:rPr lang="en-US" dirty="0" smtClean="0"/>
+              <a:t>Base.html</a:t>
+            </a:r>
+            <a:endParaRPr dirty="0"/>
+          </a:p>
+        </p:txBody>
+      </p:sp>
+      <p:sp>
+        <p:nvSpPr>
+          <p:cNvPr id="5" name="文件系统"/>
+          <p:cNvSpPr/>
+          <p:nvPr/>
+        </p:nvSpPr>
+        <p:spPr>
+          <a:xfrm>
+            <a:off x="4187371" y="3023119"/>
+            <a:ext cx="2471589" cy="689382"/>
+          </a:xfrm>
+          <a:prstGeom prst="rect">
+            <a:avLst/>
+          </a:prstGeom>
+          <a:blipFill>
+            <a:blip r:embed="rId2"/>
+          </a:blipFill>
+          <a:ln w="12700">
+            <a:miter lim="400000"/>
+          </a:ln>
+          <a:extLst>
+            <a:ext uri="{C572A759-6A51-4108-AA02-DFA0A04FC94B}">
+              <ma14:wrappingTextBoxFlag xmlns:ma14="http://schemas.microsoft.com/office/mac/drawingml/2011/main" xmlns="" val="1"/>
+            </a:ext>
+          </a:extLst>
+        </p:spPr>
+        <p:txBody>
+          <a:bodyPr lIns="50800" tIns="50800" rIns="50800" bIns="50800" anchor="ctr"/>
+          <a:lstStyle>
+            <a:lvl1pPr>
+              <a:defRPr sz="3200">
+                <a:solidFill>
+                  <a:srgbClr val="FFFFFF"/>
+                </a:solidFill>
+              </a:defRPr>
+            </a:lvl1pPr>
+          </a:lstStyle>
+          <a:p>
+            <a:r>
+              <a:rPr lang="en-US" dirty="0" smtClean="0"/>
+              <a:t>login.html</a:t>
+            </a:r>
+            <a:endParaRPr dirty="0"/>
+          </a:p>
+        </p:txBody>
+      </p:sp>
+      <p:sp>
+        <p:nvSpPr>
+          <p:cNvPr id="6" name="文件系统"/>
+          <p:cNvSpPr/>
+          <p:nvPr/>
+        </p:nvSpPr>
+        <p:spPr>
+          <a:xfrm>
+            <a:off x="4187371" y="4081839"/>
+            <a:ext cx="2471589" cy="689382"/>
+          </a:xfrm>
+          <a:prstGeom prst="rect">
+            <a:avLst/>
+          </a:prstGeom>
+          <a:blipFill>
+            <a:blip r:embed="rId2"/>
+          </a:blipFill>
+          <a:ln w="12700">
+            <a:miter lim="400000"/>
+          </a:ln>
+          <a:extLst>
+            <a:ext uri="{C572A759-6A51-4108-AA02-DFA0A04FC94B}">
+              <ma14:wrappingTextBoxFlag xmlns:ma14="http://schemas.microsoft.com/office/mac/drawingml/2011/main" xmlns="" val="1"/>
+            </a:ext>
+          </a:extLst>
+        </p:spPr>
+        <p:txBody>
+          <a:bodyPr lIns="50800" tIns="50800" rIns="50800" bIns="50800" anchor="ctr"/>
+          <a:lstStyle>
+            <a:lvl1pPr>
+              <a:defRPr sz="3200">
+                <a:solidFill>
+                  <a:srgbClr val="FFFFFF"/>
+                </a:solidFill>
+              </a:defRPr>
+            </a:lvl1pPr>
+          </a:lstStyle>
+          <a:p>
+            <a:r>
+              <a:rPr lang="en-US" smtClean="0"/>
+              <a:t>logout.html</a:t>
+            </a:r>
+            <a:endParaRPr dirty="0"/>
           </a:p>
         </p:txBody>
       </p:sp>
     </p:spTree>
+    <p:extLst>
+      <p:ext uri="{BB962C8B-B14F-4D97-AF65-F5344CB8AC3E}">
+        <p14:creationId xmlns:p14="http://schemas.microsoft.com/office/powerpoint/2010/main" val="4267159476"/>
+      </p:ext>
+    </p:extLst>
   </p:cSld>
   <p:clrMapOvr>
     <a:masterClrMapping/>
@@ -4877,7 +5008,7 @@
       </p:grpSpPr>
       <p:sp>
         <p:nvSpPr>
-          <p:cNvPr id="194" name="目录"/>
+          <p:cNvPr id="192" name="总体设计-数据库设计"/>
           <p:cNvSpPr txBox="1">
             <a:spLocks noGrp="1"/>
           </p:cNvSpPr>
@@ -4902,63 +5033,7 @@
           </a:lstStyle>
           <a:p>
             <a:r>
-              <a:t>目录</a:t>
-            </a:r>
-          </a:p>
-        </p:txBody>
-      </p:sp>
-      <p:sp>
-        <p:nvSpPr>
-          <p:cNvPr id="195" name="需求分析…"/>
-          <p:cNvSpPr txBox="1">
-            <a:spLocks noGrp="1"/>
-          </p:cNvSpPr>
-          <p:nvPr>
-            <p:ph type="body" idx="1"/>
-          </p:nvPr>
-        </p:nvSpPr>
-        <p:spPr>
-          <a:prstGeom prst="rect">
-            <a:avLst/>
-          </a:prstGeom>
-        </p:spPr>
-        <p:txBody>
-          <a:bodyPr/>
-          <a:lstStyle/>
-          <a:p>
-            <a:pPr>
-              <a:defRPr>
-                <a:solidFill>
-                  <a:srgbClr val="000000"/>
-                </a:solidFill>
-              </a:defRPr>
-            </a:pPr>
-            <a:r>
-              <a:t>需求分析</a:t>
-            </a:r>
-          </a:p>
-          <a:p>
-            <a:pPr>
-              <a:defRPr>
-                <a:solidFill>
-                  <a:srgbClr val="000000"/>
-                </a:solidFill>
-              </a:defRPr>
-            </a:pPr>
-            <a:r>
-              <a:t>总体设计</a:t>
-            </a:r>
-          </a:p>
-          <a:p>
-            <a:pPr>
-              <a:defRPr>
-                <a:solidFill>
-                  <a:srgbClr val="FF2600"/>
-                </a:solidFill>
-              </a:defRPr>
-            </a:pPr>
-            <a:r>
-              <a:t>详细设计</a:t>
+              <a:t>总体设计-数据库设计</a:t>
             </a:r>
           </a:p>
         </p:txBody>
@@ -4973,6 +5048,120 @@
 </file>
 
 <file path=ppt/slides/slide13.xml><?xml version="1.0" encoding="utf-8"?>
+<p:sld xmlns:a="http://schemas.openxmlformats.org/drawingml/2006/main" xmlns:r="http://schemas.openxmlformats.org/officeDocument/2006/relationships" xmlns:p="http://schemas.openxmlformats.org/presentationml/2006/main">
+  <p:cSld>
+    <p:spTree>
+      <p:nvGrpSpPr>
+        <p:cNvPr id="1" name=""/>
+        <p:cNvGrpSpPr/>
+        <p:nvPr/>
+      </p:nvGrpSpPr>
+      <p:grpSpPr>
+        <a:xfrm>
+          <a:off x="0" y="0"/>
+          <a:ext cx="0" cy="0"/>
+          <a:chOff x="0" y="0"/>
+          <a:chExt cx="0" cy="0"/>
+        </a:xfrm>
+      </p:grpSpPr>
+      <p:sp>
+        <p:nvSpPr>
+          <p:cNvPr id="194" name="目录"/>
+          <p:cNvSpPr txBox="1">
+            <a:spLocks noGrp="1"/>
+          </p:cNvSpPr>
+          <p:nvPr>
+            <p:ph type="title"/>
+          </p:nvPr>
+        </p:nvSpPr>
+        <p:spPr>
+          <a:prstGeom prst="rect">
+            <a:avLst/>
+          </a:prstGeom>
+        </p:spPr>
+        <p:txBody>
+          <a:bodyPr/>
+          <a:lstStyle>
+            <a:lvl1pPr defTabSz="525779">
+              <a:spcBef>
+                <a:spcPts val="1400"/>
+              </a:spcBef>
+              <a:defRPr sz="6300"/>
+            </a:lvl1pPr>
+          </a:lstStyle>
+          <a:p>
+            <a:r>
+              <a:t>目录</a:t>
+            </a:r>
+          </a:p>
+        </p:txBody>
+      </p:sp>
+      <p:sp>
+        <p:nvSpPr>
+          <p:cNvPr id="195" name="需求分析…"/>
+          <p:cNvSpPr txBox="1">
+            <a:spLocks noGrp="1"/>
+          </p:cNvSpPr>
+          <p:nvPr>
+            <p:ph type="body" idx="1"/>
+          </p:nvPr>
+        </p:nvSpPr>
+        <p:spPr>
+          <a:prstGeom prst="rect">
+            <a:avLst/>
+          </a:prstGeom>
+        </p:spPr>
+        <p:txBody>
+          <a:bodyPr/>
+          <a:lstStyle/>
+          <a:p>
+            <a:pPr>
+              <a:defRPr>
+                <a:solidFill>
+                  <a:srgbClr val="000000"/>
+                </a:solidFill>
+              </a:defRPr>
+            </a:pPr>
+            <a:r>
+              <a:t>需求分析</a:t>
+            </a:r>
+          </a:p>
+          <a:p>
+            <a:pPr>
+              <a:defRPr>
+                <a:solidFill>
+                  <a:srgbClr val="000000"/>
+                </a:solidFill>
+              </a:defRPr>
+            </a:pPr>
+            <a:r>
+              <a:t>总体设计</a:t>
+            </a:r>
+          </a:p>
+          <a:p>
+            <a:pPr>
+              <a:defRPr>
+                <a:solidFill>
+                  <a:srgbClr val="FF2600"/>
+                </a:solidFill>
+              </a:defRPr>
+            </a:pPr>
+            <a:r>
+              <a:t>详细设计</a:t>
+            </a:r>
+          </a:p>
+        </p:txBody>
+      </p:sp>
+    </p:spTree>
+  </p:cSld>
+  <p:clrMapOvr>
+    <a:masterClrMapping/>
+  </p:clrMapOvr>
+  <p:transition spd="med"/>
+</p:sld>
+</file>
+
+<file path=ppt/slides/slide14.xml><?xml version="1.0" encoding="utf-8"?>
 <p:sld xmlns:a="http://schemas.openxmlformats.org/drawingml/2006/main" xmlns:r="http://schemas.openxmlformats.org/officeDocument/2006/relationships" xmlns:p="http://schemas.openxmlformats.org/presentationml/2006/main">
   <p:cSld>
     <p:spTree>

</xml_diff>